<commit_message>
Implement isMutating method and modify save only when mutated
</commit_message>
<xml_diff>
--- a/doc/Diagrams.pptx
+++ b/doc/Diagrams.pptx
@@ -1,6 +1,6 @@
 
 <file path=ppt/presentation.xml><?xml version="1.0" encoding="utf-8"?>
-<p:presentation xmlns:a="http://schemas.openxmlformats.org/drawingml/2006/main" xmlns:r="http://schemas.openxmlformats.org/officeDocument/2006/relationships" xmlns:p="http://schemas.openxmlformats.org/presentationml/2006/main" saveSubsetFonts="1">
+<p:presentation xmlns:a="http://schemas.openxmlformats.org/drawingml/2006/main" xmlns:r="http://schemas.openxmlformats.org/officeDocument/2006/relationships" xmlns:p="http://schemas.openxmlformats.org/presentationml/2006/main" serverZoom="34225" saveSubsetFonts="1">
   <p:sldMasterIdLst>
     <p:sldMasterId id="2147483648" r:id="rId1"/>
   </p:sldMasterIdLst>
@@ -108,6 +108,22 @@
       </a:defRPr>
     </a:lvl9pPr>
   </p:defaultTextStyle>
+  <p:extLst>
+    <p:ext uri="{EFAFB233-063F-42B5-8137-9DF3F51BA10A}">
+      <p15:sldGuideLst xmlns:p15="http://schemas.microsoft.com/office/powerpoint/2012/main">
+        <p15:guide id="1" orient="horz" pos="2160">
+          <p15:clr>
+            <a:srgbClr val="A4A3A4"/>
+          </p15:clr>
+        </p15:guide>
+        <p15:guide id="2" pos="2880">
+          <p15:clr>
+            <a:srgbClr val="A4A3A4"/>
+          </p15:clr>
+        </p15:guide>
+      </p15:sldGuideLst>
+    </p:ext>
+  </p:extLst>
 </p:presentation>
 </file>
 
@@ -193,7 +209,7 @@
           <a:p>
             <a:fld id="{F5CC4B3F-88C1-4FFA-B1B6-F41C21DC6924}" type="datetimeFigureOut">
               <a:rPr lang="en-US" smtClean="0"/>
-              <a:t>9/4/2016</a:t>
+              <a:t>9/13/2016</a:t>
             </a:fld>
             <a:endParaRPr lang="en-US"/>
           </a:p>
@@ -726,7 +742,7 @@
           <a:p>
             <a:fld id="{78C97017-6FC3-485B-9764-EAC9E56C1D49}" type="datetimeFigureOut">
               <a:rPr lang="en-US" smtClean="0"/>
-              <a:t>9/4/2016</a:t>
+              <a:t>9/13/2016</a:t>
             </a:fld>
             <a:endParaRPr lang="en-US"/>
           </a:p>
@@ -896,7 +912,7 @@
           <a:p>
             <a:fld id="{78C97017-6FC3-485B-9764-EAC9E56C1D49}" type="datetimeFigureOut">
               <a:rPr lang="en-US" smtClean="0"/>
-              <a:t>9/4/2016</a:t>
+              <a:t>9/13/2016</a:t>
             </a:fld>
             <a:endParaRPr lang="en-US"/>
           </a:p>
@@ -1076,7 +1092,7 @@
           <a:p>
             <a:fld id="{78C97017-6FC3-485B-9764-EAC9E56C1D49}" type="datetimeFigureOut">
               <a:rPr lang="en-US" smtClean="0"/>
-              <a:t>9/4/2016</a:t>
+              <a:t>9/13/2016</a:t>
             </a:fld>
             <a:endParaRPr lang="en-US"/>
           </a:p>
@@ -1246,7 +1262,7 @@
           <a:p>
             <a:fld id="{78C97017-6FC3-485B-9764-EAC9E56C1D49}" type="datetimeFigureOut">
               <a:rPr lang="en-US" smtClean="0"/>
-              <a:t>9/4/2016</a:t>
+              <a:t>9/13/2016</a:t>
             </a:fld>
             <a:endParaRPr lang="en-US"/>
           </a:p>
@@ -1492,7 +1508,7 @@
           <a:p>
             <a:fld id="{78C97017-6FC3-485B-9764-EAC9E56C1D49}" type="datetimeFigureOut">
               <a:rPr lang="en-US" smtClean="0"/>
-              <a:t>9/4/2016</a:t>
+              <a:t>9/13/2016</a:t>
             </a:fld>
             <a:endParaRPr lang="en-US"/>
           </a:p>
@@ -1780,7 +1796,7 @@
           <a:p>
             <a:fld id="{78C97017-6FC3-485B-9764-EAC9E56C1D49}" type="datetimeFigureOut">
               <a:rPr lang="en-US" smtClean="0"/>
-              <a:t>9/4/2016</a:t>
+              <a:t>9/13/2016</a:t>
             </a:fld>
             <a:endParaRPr lang="en-US"/>
           </a:p>
@@ -2202,7 +2218,7 @@
           <a:p>
             <a:fld id="{78C97017-6FC3-485B-9764-EAC9E56C1D49}" type="datetimeFigureOut">
               <a:rPr lang="en-US" smtClean="0"/>
-              <a:t>9/4/2016</a:t>
+              <a:t>9/13/2016</a:t>
             </a:fld>
             <a:endParaRPr lang="en-US"/>
           </a:p>
@@ -2320,7 +2336,7 @@
           <a:p>
             <a:fld id="{78C97017-6FC3-485B-9764-EAC9E56C1D49}" type="datetimeFigureOut">
               <a:rPr lang="en-US" smtClean="0"/>
-              <a:t>9/4/2016</a:t>
+              <a:t>9/13/2016</a:t>
             </a:fld>
             <a:endParaRPr lang="en-US"/>
           </a:p>
@@ -2415,7 +2431,7 @@
           <a:p>
             <a:fld id="{78C97017-6FC3-485B-9764-EAC9E56C1D49}" type="datetimeFigureOut">
               <a:rPr lang="en-US" smtClean="0"/>
-              <a:t>9/4/2016</a:t>
+              <a:t>9/13/2016</a:t>
             </a:fld>
             <a:endParaRPr lang="en-US"/>
           </a:p>
@@ -2692,7 +2708,7 @@
           <a:p>
             <a:fld id="{78C97017-6FC3-485B-9764-EAC9E56C1D49}" type="datetimeFigureOut">
               <a:rPr lang="en-US" smtClean="0"/>
-              <a:t>9/4/2016</a:t>
+              <a:t>9/13/2016</a:t>
             </a:fld>
             <a:endParaRPr lang="en-US"/>
           </a:p>
@@ -2945,7 +2961,7 @@
           <a:p>
             <a:fld id="{78C97017-6FC3-485B-9764-EAC9E56C1D49}" type="datetimeFigureOut">
               <a:rPr lang="en-US" smtClean="0"/>
-              <a:t>9/4/2016</a:t>
+              <a:t>9/13/2016</a:t>
             </a:fld>
             <a:endParaRPr lang="en-US"/>
           </a:p>
@@ -3158,7 +3174,7 @@
           <a:p>
             <a:fld id="{78C97017-6FC3-485B-9764-EAC9E56C1D49}" type="datetimeFigureOut">
               <a:rPr lang="en-US" smtClean="0"/>
-              <a:t>9/4/2016</a:t>
+              <a:t>9/13/2016</a:t>
             </a:fld>
             <a:endParaRPr lang="en-US"/>
           </a:p>

</xml_diff>